<commit_message>
capture usecase non-cancellation oct 15
In particular (among other items) to follow up on MEIG use cases (we ran out of time in the F2F call...)
</commit_message>
<xml_diff>
--- a/PRESENTATIONS/2020-10-online-f2f/2020-10-07-WoT-F2F-Opening-McCool.pptx
+++ b/PRESENTATIONS/2020-10-online-f2f/2020-10-07-WoT-F2F-Opening-McCool.pptx
@@ -5319,6 +5319,12 @@
             <a:r>
               <a:rPr lang="en-CA" b="1" i="1" dirty="0"/>
               <a:t>TD on Oct 14: Cancelled.</a:t>
+            </a:r>
+          </a:p>
+          <a:p>
+            <a:r>
+              <a:rPr lang="en-CA" b="1" i="1" dirty="0"/>
+              <a:t>Use Cases on Oct 15: Not cancelled.</a:t>
             </a:r>
           </a:p>
           <a:p>

</xml_diff>